<commit_message>
Restructure updateJson function code
</commit_message>
<xml_diff>
--- a/forTesting/Testing 13.pptx
+++ b/forTesting/Testing 13.pptx
@@ -246,7 +246,7 @@
           <a:p>
             <a:fld id="{65E63846-8A14-439F-8620-DCE09784B879}" type="datetimeFigureOut">
               <a:rPr lang="en-US" smtClean="0"/>
-              <a:t>05-Jan-17</a:t>
+              <a:t>17-Aug-17</a:t>
             </a:fld>
             <a:endParaRPr lang="en-US"/>
           </a:p>
@@ -416,7 +416,7 @@
           <a:p>
             <a:fld id="{65E63846-8A14-439F-8620-DCE09784B879}" type="datetimeFigureOut">
               <a:rPr lang="en-US" smtClean="0"/>
-              <a:t>05-Jan-17</a:t>
+              <a:t>17-Aug-17</a:t>
             </a:fld>
             <a:endParaRPr lang="en-US"/>
           </a:p>
@@ -596,7 +596,7 @@
           <a:p>
             <a:fld id="{65E63846-8A14-439F-8620-DCE09784B879}" type="datetimeFigureOut">
               <a:rPr lang="en-US" smtClean="0"/>
-              <a:t>05-Jan-17</a:t>
+              <a:t>17-Aug-17</a:t>
             </a:fld>
             <a:endParaRPr lang="en-US"/>
           </a:p>
@@ -766,7 +766,7 @@
           <a:p>
             <a:fld id="{65E63846-8A14-439F-8620-DCE09784B879}" type="datetimeFigureOut">
               <a:rPr lang="en-US" smtClean="0"/>
-              <a:t>05-Jan-17</a:t>
+              <a:t>17-Aug-17</a:t>
             </a:fld>
             <a:endParaRPr lang="en-US"/>
           </a:p>
@@ -1012,7 +1012,7 @@
           <a:p>
             <a:fld id="{65E63846-8A14-439F-8620-DCE09784B879}" type="datetimeFigureOut">
               <a:rPr lang="en-US" smtClean="0"/>
-              <a:t>05-Jan-17</a:t>
+              <a:t>17-Aug-17</a:t>
             </a:fld>
             <a:endParaRPr lang="en-US"/>
           </a:p>
@@ -1244,7 +1244,7 @@
           <a:p>
             <a:fld id="{65E63846-8A14-439F-8620-DCE09784B879}" type="datetimeFigureOut">
               <a:rPr lang="en-US" smtClean="0"/>
-              <a:t>05-Jan-17</a:t>
+              <a:t>17-Aug-17</a:t>
             </a:fld>
             <a:endParaRPr lang="en-US"/>
           </a:p>
@@ -1611,7 +1611,7 @@
           <a:p>
             <a:fld id="{65E63846-8A14-439F-8620-DCE09784B879}" type="datetimeFigureOut">
               <a:rPr lang="en-US" smtClean="0"/>
-              <a:t>05-Jan-17</a:t>
+              <a:t>17-Aug-17</a:t>
             </a:fld>
             <a:endParaRPr lang="en-US"/>
           </a:p>
@@ -1729,7 +1729,7 @@
           <a:p>
             <a:fld id="{65E63846-8A14-439F-8620-DCE09784B879}" type="datetimeFigureOut">
               <a:rPr lang="en-US" smtClean="0"/>
-              <a:t>05-Jan-17</a:t>
+              <a:t>17-Aug-17</a:t>
             </a:fld>
             <a:endParaRPr lang="en-US"/>
           </a:p>
@@ -1824,7 +1824,7 @@
           <a:p>
             <a:fld id="{65E63846-8A14-439F-8620-DCE09784B879}" type="datetimeFigureOut">
               <a:rPr lang="en-US" smtClean="0"/>
-              <a:t>05-Jan-17</a:t>
+              <a:t>17-Aug-17</a:t>
             </a:fld>
             <a:endParaRPr lang="en-US"/>
           </a:p>
@@ -2101,7 +2101,7 @@
           <a:p>
             <a:fld id="{65E63846-8A14-439F-8620-DCE09784B879}" type="datetimeFigureOut">
               <a:rPr lang="en-US" smtClean="0"/>
-              <a:t>05-Jan-17</a:t>
+              <a:t>17-Aug-17</a:t>
             </a:fld>
             <a:endParaRPr lang="en-US"/>
           </a:p>
@@ -2354,7 +2354,7 @@
           <a:p>
             <a:fld id="{65E63846-8A14-439F-8620-DCE09784B879}" type="datetimeFigureOut">
               <a:rPr lang="en-US" smtClean="0"/>
-              <a:t>05-Jan-17</a:t>
+              <a:t>17-Aug-17</a:t>
             </a:fld>
             <a:endParaRPr lang="en-US"/>
           </a:p>
@@ -2567,7 +2567,7 @@
           <a:p>
             <a:fld id="{65E63846-8A14-439F-8620-DCE09784B879}" type="datetimeFigureOut">
               <a:rPr lang="en-US" smtClean="0"/>
-              <a:t>05-Jan-17</a:t>
+              <a:t>17-Aug-17</a:t>
             </a:fld>
             <a:endParaRPr lang="en-US"/>
           </a:p>
@@ -4175,11 +4175,7 @@
             </a:r>
             <a:r>
               <a:rPr lang="en-US" sz="1400" smtClean="0"/>
-              <a:t>be </a:t>
-            </a:r>
-            <a:r>
-              <a:rPr lang="en-US" sz="1400" smtClean="0"/>
-              <a:t>established </a:t>
+              <a:t>be established </a:t>
             </a:r>
             <a:r>
               <a:rPr lang="en-US" sz="1400" dirty="0" smtClean="0"/>

</xml_diff>